<commit_message>
Add notes to ppt
</commit_message>
<xml_diff>
--- a/Class2/Tech314_2.pptx
+++ b/Class2/Tech314_2.pptx
@@ -8,6 +8,8 @@
     <p:sldId id="256" r:id="rId2"/>
     <p:sldId id="263" r:id="rId3"/>
     <p:sldId id="264" r:id="rId4"/>
+    <p:sldId id="265" r:id="rId5"/>
+    <p:sldId id="266" r:id="rId6"/>
   </p:sldIdLst>
   <p:sldSz cx="12192000" cy="6858000"/>
   <p:notesSz cx="6858000" cy="9144000"/>
@@ -6174,35 +6176,242 @@
           </a:p>
         </p:txBody>
       </p:sp>
-      <p:sp>
-        <p:nvSpPr>
-          <p:cNvPr id="3" name="Content Placeholder 2">
+      <p:pic>
+        <p:nvPicPr>
+          <p:cNvPr id="4" name="Content Placeholder 3">
             <a:extLst>
               <a:ext uri="{FF2B5EF4-FFF2-40B4-BE49-F238E27FC236}">
-                <a16:creationId xmlns:a16="http://schemas.microsoft.com/office/drawing/2014/main" id="{E63B6B2E-94BF-4B3B-8C60-DE1D474E1C4C}"/>
+                <a16:creationId xmlns:a16="http://schemas.microsoft.com/office/drawing/2014/main" id="{5CBD0BAC-EDA0-4349-8E15-22C4B310FF50}"/>
               </a:ext>
             </a:extLst>
           </p:cNvPr>
-          <p:cNvSpPr>
-            <a:spLocks noGrp="1"/>
-          </p:cNvSpPr>
+          <p:cNvPicPr>
+            <a:picLocks noGrp="1" noChangeAspect="1"/>
+          </p:cNvPicPr>
           <p:nvPr>
             <p:ph idx="1"/>
           </p:nvPr>
-        </p:nvSpPr>
-        <p:spPr/>
-        <p:txBody>
-          <a:bodyPr/>
-          <a:lstStyle/>
-          <a:p>
-            <a:endParaRPr lang="en-US"/>
-          </a:p>
-        </p:txBody>
-      </p:sp>
+        </p:nvPicPr>
+        <p:blipFill>
+          <a:blip r:embed="rId2"/>
+          <a:stretch>
+            <a:fillRect/>
+          </a:stretch>
+        </p:blipFill>
+        <p:spPr>
+          <a:xfrm>
+            <a:off x="4398345" y="2052638"/>
+            <a:ext cx="2357086" cy="4195762"/>
+          </a:xfrm>
+          <a:prstGeom prst="rect">
+            <a:avLst/>
+          </a:prstGeom>
+        </p:spPr>
+      </p:pic>
     </p:spTree>
     <p:extLst>
       <p:ext uri="{BB962C8B-B14F-4D97-AF65-F5344CB8AC3E}">
         <p14:creationId xmlns:p14="http://schemas.microsoft.com/office/powerpoint/2010/main" val="2250160954"/>
+      </p:ext>
+    </p:extLst>
+  </p:cSld>
+  <p:clrMapOvr>
+    <a:masterClrMapping/>
+  </p:clrMapOvr>
+</p:sld>
+</file>
+
+<file path=ppt/slides/slide4.xml><?xml version="1.0" encoding="utf-8"?>
+<p:sld xmlns:a="http://schemas.openxmlformats.org/drawingml/2006/main" xmlns:r="http://schemas.openxmlformats.org/officeDocument/2006/relationships" xmlns:p="http://schemas.openxmlformats.org/presentationml/2006/main">
+  <p:cSld>
+    <p:spTree>
+      <p:nvGrpSpPr>
+        <p:cNvPr id="1" name=""/>
+        <p:cNvGrpSpPr/>
+        <p:nvPr/>
+      </p:nvGrpSpPr>
+      <p:grpSpPr>
+        <a:xfrm>
+          <a:off x="0" y="0"/>
+          <a:ext cx="0" cy="0"/>
+          <a:chOff x="0" y="0"/>
+          <a:chExt cx="0" cy="0"/>
+        </a:xfrm>
+      </p:grpSpPr>
+      <p:sp>
+        <p:nvSpPr>
+          <p:cNvPr id="2" name="Title 1">
+            <a:extLst>
+              <a:ext uri="{FF2B5EF4-FFF2-40B4-BE49-F238E27FC236}">
+                <a16:creationId xmlns:a16="http://schemas.microsoft.com/office/drawing/2014/main" id="{B126566A-B77D-4484-A7CE-3284C5AA2813}"/>
+              </a:ext>
+            </a:extLst>
+          </p:cNvPr>
+          <p:cNvSpPr>
+            <a:spLocks noGrp="1"/>
+          </p:cNvSpPr>
+          <p:nvPr>
+            <p:ph type="title"/>
+          </p:nvPr>
+        </p:nvSpPr>
+        <p:spPr/>
+        <p:txBody>
+          <a:bodyPr/>
+          <a:lstStyle/>
+          <a:p>
+            <a:r>
+              <a:rPr lang="en-US" dirty="0"/>
+              <a:t>Components</a:t>
+            </a:r>
+          </a:p>
+        </p:txBody>
+      </p:sp>
+      <p:sp>
+        <p:nvSpPr>
+          <p:cNvPr id="3" name="Content Placeholder 2">
+            <a:extLst>
+              <a:ext uri="{FF2B5EF4-FFF2-40B4-BE49-F238E27FC236}">
+                <a16:creationId xmlns:a16="http://schemas.microsoft.com/office/drawing/2014/main" id="{D5C532CB-0A66-4490-8837-FC7FDE64CE7E}"/>
+              </a:ext>
+            </a:extLst>
+          </p:cNvPr>
+          <p:cNvSpPr>
+            <a:spLocks noGrp="1"/>
+          </p:cNvSpPr>
+          <p:nvPr>
+            <p:ph idx="1"/>
+          </p:nvPr>
+        </p:nvSpPr>
+        <p:spPr/>
+        <p:txBody>
+          <a:bodyPr/>
+          <a:lstStyle/>
+          <a:p>
+            <a:r>
+              <a:rPr lang="en-US" dirty="0"/>
+              <a:t>Text</a:t>
+            </a:r>
+          </a:p>
+          <a:p>
+            <a:r>
+              <a:rPr lang="en-US" dirty="0"/>
+              <a:t>Style</a:t>
+            </a:r>
+          </a:p>
+          <a:p>
+            <a:r>
+              <a:rPr lang="en-US" dirty="0"/>
+              <a:t>Dimension</a:t>
+            </a:r>
+          </a:p>
+          <a:p>
+            <a:r>
+              <a:rPr lang="en-US" dirty="0"/>
+              <a:t>Button</a:t>
+            </a:r>
+          </a:p>
+          <a:p>
+            <a:r>
+              <a:rPr lang="en-US" dirty="0"/>
+              <a:t>Props</a:t>
+            </a:r>
+          </a:p>
+        </p:txBody>
+      </p:sp>
+    </p:spTree>
+    <p:extLst>
+      <p:ext uri="{BB962C8B-B14F-4D97-AF65-F5344CB8AC3E}">
+        <p14:creationId xmlns:p14="http://schemas.microsoft.com/office/powerpoint/2010/main" val="693903474"/>
+      </p:ext>
+    </p:extLst>
+  </p:cSld>
+  <p:clrMapOvr>
+    <a:masterClrMapping/>
+  </p:clrMapOvr>
+</p:sld>
+</file>
+
+<file path=ppt/slides/slide5.xml><?xml version="1.0" encoding="utf-8"?>
+<p:sld xmlns:a="http://schemas.openxmlformats.org/drawingml/2006/main" xmlns:r="http://schemas.openxmlformats.org/officeDocument/2006/relationships" xmlns:p="http://schemas.openxmlformats.org/presentationml/2006/main">
+  <p:cSld>
+    <p:spTree>
+      <p:nvGrpSpPr>
+        <p:cNvPr id="1" name=""/>
+        <p:cNvGrpSpPr/>
+        <p:nvPr/>
+      </p:nvGrpSpPr>
+      <p:grpSpPr>
+        <a:xfrm>
+          <a:off x="0" y="0"/>
+          <a:ext cx="0" cy="0"/>
+          <a:chOff x="0" y="0"/>
+          <a:chExt cx="0" cy="0"/>
+        </a:xfrm>
+      </p:grpSpPr>
+      <p:sp>
+        <p:nvSpPr>
+          <p:cNvPr id="2" name="Title 1">
+            <a:extLst>
+              <a:ext uri="{FF2B5EF4-FFF2-40B4-BE49-F238E27FC236}">
+                <a16:creationId xmlns:a16="http://schemas.microsoft.com/office/drawing/2014/main" id="{2E724A69-01E4-4248-9695-8AB18E9412D4}"/>
+              </a:ext>
+            </a:extLst>
+          </p:cNvPr>
+          <p:cNvSpPr>
+            <a:spLocks noGrp="1"/>
+          </p:cNvSpPr>
+          <p:nvPr>
+            <p:ph type="title"/>
+          </p:nvPr>
+        </p:nvSpPr>
+        <p:spPr/>
+        <p:txBody>
+          <a:bodyPr/>
+          <a:lstStyle/>
+          <a:p>
+            <a:r>
+              <a:rPr lang="en-US" dirty="0"/>
+              <a:t>Links</a:t>
+            </a:r>
+          </a:p>
+        </p:txBody>
+      </p:sp>
+      <p:sp>
+        <p:nvSpPr>
+          <p:cNvPr id="3" name="Content Placeholder 2">
+            <a:extLst>
+              <a:ext uri="{FF2B5EF4-FFF2-40B4-BE49-F238E27FC236}">
+                <a16:creationId xmlns:a16="http://schemas.microsoft.com/office/drawing/2014/main" id="{08609C98-C7DA-4EA7-A726-9FA6B7F44833}"/>
+              </a:ext>
+            </a:extLst>
+          </p:cNvPr>
+          <p:cNvSpPr>
+            <a:spLocks noGrp="1"/>
+          </p:cNvSpPr>
+          <p:nvPr>
+            <p:ph idx="1"/>
+          </p:nvPr>
+        </p:nvSpPr>
+        <p:spPr/>
+        <p:txBody>
+          <a:bodyPr/>
+          <a:lstStyle/>
+          <a:p>
+            <a:r>
+              <a:rPr lang="en-US"/>
+              <a:t>https</a:t>
+            </a:r>
+            <a:r>
+              <a:rPr lang="en-US" dirty="0"/>
+              <a:t>://github.com/argentaegis/ReactNativeClass</a:t>
+            </a:r>
+          </a:p>
+        </p:txBody>
+      </p:sp>
+    </p:spTree>
+    <p:extLst>
+      <p:ext uri="{BB962C8B-B14F-4D97-AF65-F5344CB8AC3E}">
+        <p14:creationId xmlns:p14="http://schemas.microsoft.com/office/powerpoint/2010/main" val="1853707534"/>
       </p:ext>
     </p:extLst>
   </p:cSld>

</xml_diff>